<commit_message>
Fixed rubric feedb ack
</commit_message>
<xml_diff>
--- a/JSON Files.pptx
+++ b/JSON Files.pptx
@@ -111,6 +111,11 @@
       </a:defRPr>
     </a:lvl9pPr>
   </p:defaultTextStyle>
+  <p:extLst>
+    <p:ext uri="{EFAFB233-063F-42B5-8137-9DF3F51BA10A}">
+      <p15:sldGuideLst xmlns:p15="http://schemas.microsoft.com/office/powerpoint/2012/main"/>
+    </p:ext>
+  </p:extLst>
 </p:presentation>
 </file>
 
@@ -1523,7 +1528,7 @@
           <a:p>
             <a:fld id="{BBF04B1C-48D0-4103-8687-D0CC2D602F35}" type="datetimeFigureOut">
               <a:rPr lang="en-US" smtClean="0"/>
-              <a:t>11/2/2023</a:t>
+              <a:t>11/4/2023</a:t>
             </a:fld>
             <a:endParaRPr lang="en-US"/>
           </a:p>
@@ -2982,7 +2987,7 @@
           <a:p>
             <a:fld id="{BBF04B1C-48D0-4103-8687-D0CC2D602F35}" type="datetimeFigureOut">
               <a:rPr lang="en-US" smtClean="0"/>
-              <a:t>11/2/2023</a:t>
+              <a:t>11/4/2023</a:t>
             </a:fld>
             <a:endParaRPr lang="en-US"/>
           </a:p>
@@ -4435,7 +4440,7 @@
           <a:p>
             <a:fld id="{BBF04B1C-48D0-4103-8687-D0CC2D602F35}" type="datetimeFigureOut">
               <a:rPr lang="en-US" smtClean="0"/>
-              <a:t>11/2/2023</a:t>
+              <a:t>11/4/2023</a:t>
             </a:fld>
             <a:endParaRPr lang="en-US"/>
           </a:p>
@@ -5890,7 +5895,7 @@
           <a:p>
             <a:fld id="{BBF04B1C-48D0-4103-8687-D0CC2D602F35}" type="datetimeFigureOut">
               <a:rPr lang="en-US" smtClean="0"/>
-              <a:t>11/2/2023</a:t>
+              <a:t>11/4/2023</a:t>
             </a:fld>
             <a:endParaRPr lang="en-US"/>
           </a:p>
@@ -7398,7 +7403,7 @@
           <a:p>
             <a:fld id="{BBF04B1C-48D0-4103-8687-D0CC2D602F35}" type="datetimeFigureOut">
               <a:rPr lang="en-US" smtClean="0"/>
-              <a:t>11/2/2023</a:t>
+              <a:t>11/4/2023</a:t>
             </a:fld>
             <a:endParaRPr lang="en-US"/>
           </a:p>
@@ -8919,7 +8924,7 @@
           <a:p>
             <a:fld id="{BBF04B1C-48D0-4103-8687-D0CC2D602F35}" type="datetimeFigureOut">
               <a:rPr lang="en-US" smtClean="0"/>
-              <a:t>11/2/2023</a:t>
+              <a:t>11/4/2023</a:t>
             </a:fld>
             <a:endParaRPr lang="en-US"/>
           </a:p>
@@ -10584,7 +10589,7 @@
           <a:p>
             <a:fld id="{BBF04B1C-48D0-4103-8687-D0CC2D602F35}" type="datetimeFigureOut">
               <a:rPr lang="en-US" smtClean="0"/>
-              <a:t>11/2/2023</a:t>
+              <a:t>11/4/2023</a:t>
             </a:fld>
             <a:endParaRPr lang="en-US"/>
           </a:p>
@@ -11982,7 +11987,7 @@
           <a:p>
             <a:fld id="{BBF04B1C-48D0-4103-8687-D0CC2D602F35}" type="datetimeFigureOut">
               <a:rPr lang="en-US" smtClean="0"/>
-              <a:t>11/2/2023</a:t>
+              <a:t>11/4/2023</a:t>
             </a:fld>
             <a:endParaRPr lang="en-US"/>
           </a:p>
@@ -12082,7 +12087,7 @@
           <a:p>
             <a:fld id="{BBF04B1C-48D0-4103-8687-D0CC2D602F35}" type="datetimeFigureOut">
               <a:rPr lang="en-US" smtClean="0"/>
-              <a:t>11/2/2023</a:t>
+              <a:t>11/4/2023</a:t>
             </a:fld>
             <a:endParaRPr lang="en-US"/>
           </a:p>
@@ -13608,7 +13613,7 @@
           <a:p>
             <a:fld id="{BBF04B1C-48D0-4103-8687-D0CC2D602F35}" type="datetimeFigureOut">
               <a:rPr lang="en-US" smtClean="0"/>
-              <a:t>11/2/2023</a:t>
+              <a:t>11/4/2023</a:t>
             </a:fld>
             <a:endParaRPr lang="en-US"/>
           </a:p>
@@ -15144,7 +15149,7 @@
           <a:p>
             <a:fld id="{BBF04B1C-48D0-4103-8687-D0CC2D602F35}" type="datetimeFigureOut">
               <a:rPr lang="en-US" smtClean="0"/>
-              <a:t>11/2/2023</a:t>
+              <a:t>11/4/2023</a:t>
             </a:fld>
             <a:endParaRPr lang="en-US"/>
           </a:p>
@@ -15367,7 +15372,7 @@
           <a:p>
             <a:fld id="{BBF04B1C-48D0-4103-8687-D0CC2D602F35}" type="datetimeFigureOut">
               <a:rPr lang="en-US" smtClean="0"/>
-              <a:t>11/2/2023</a:t>
+              <a:t>11/4/2023</a:t>
             </a:fld>
             <a:endParaRPr lang="en-US"/>
           </a:p>
@@ -16499,7 +16504,7 @@
           <a:p>
             <a:r>
               <a:rPr lang="en-US" dirty="0"/>
-              <a:t>In a more complex property, if we had a variable with two properties, we would access each of them using two different arrays.</a:t>
+              <a:t>In a more complex property, if we had a variable with two properties, we would access each of them using two different index variables.</a:t>
             </a:r>
           </a:p>
           <a:p>
@@ -16590,7 +16595,56 @@
           <a:bodyPr/>
           <a:lstStyle/>
           <a:p>
-            <a:endParaRPr lang="en-US" dirty="0"/>
+            <a:r>
+              <a:rPr lang="en-US" dirty="0">
+                <a:solidFill>
+                  <a:srgbClr val="FFC000"/>
+                </a:solidFill>
+                <a:hlinkClick r:id="rId2">
+                  <a:extLst>
+                    <a:ext uri="{A12FA001-AC4F-418D-AE19-62706E023703}">
+                      <ahyp:hlinkClr xmlns:ahyp="http://schemas.microsoft.com/office/drawing/2018/hyperlinkcolor" val="tx"/>
+                    </a:ext>
+                  </a:extLst>
+                </a:hlinkClick>
+              </a:rPr>
+              <a:t>JSONs </a:t>
+            </a:r>
+            <a:r>
+              <a:rPr lang="en-US" dirty="0" err="1">
+                <a:solidFill>
+                  <a:srgbClr val="FFC000"/>
+                </a:solidFill>
+                <a:hlinkClick r:id="rId2">
+                  <a:extLst>
+                    <a:ext uri="{A12FA001-AC4F-418D-AE19-62706E023703}">
+                      <ahyp:hlinkClr xmlns:ahyp="http://schemas.microsoft.com/office/drawing/2018/hyperlinkcolor" val="tx"/>
+                    </a:ext>
+                  </a:extLst>
+                </a:hlinkClick>
+              </a:rPr>
+              <a:t>CodePen</a:t>
+            </a:r>
+            <a:r>
+              <a:rPr lang="en-US" dirty="0">
+                <a:solidFill>
+                  <a:srgbClr val="FFC000"/>
+                </a:solidFill>
+                <a:hlinkClick r:id="rId2">
+                  <a:extLst>
+                    <a:ext uri="{A12FA001-AC4F-418D-AE19-62706E023703}">
+                      <ahyp:hlinkClr xmlns:ahyp="http://schemas.microsoft.com/office/drawing/2018/hyperlinkcolor" val="tx"/>
+                    </a:ext>
+                  </a:extLst>
+                </a:hlinkClick>
+              </a:rPr>
+              <a:t> Demonstration</a:t>
+            </a:r>
+            <a:endParaRPr lang="en-US" dirty="0">
+              <a:solidFill>
+                <a:srgbClr val="FFC000"/>
+              </a:solidFill>
+            </a:endParaRPr>
           </a:p>
         </p:txBody>
       </p:sp>

</xml_diff>